<commit_message>
-Added eraly stopping to all classifiers -Bug Fix plotting embeddings with ProtoNet -Rewrite, fix and extending ProtoNet Batch Sampler -Several Bug Fixes
</commit_message>
<xml_diff>
--- a/materials/images.pptx
+++ b/materials/images.pptx
@@ -7,6 +7,7 @@
   <p:sldIdLst>
     <p:sldId id="276" r:id="rId2"/>
     <p:sldId id="278" r:id="rId3"/>
+    <p:sldId id="279" r:id="rId4"/>
   </p:sldIdLst>
   <p:sldSz cx="32399288" cy="21599525"/>
   <p:notesSz cx="6858000" cy="9144000"/>
@@ -244,7 +245,7 @@
           <a:p>
             <a:fld id="{F39F49B5-785A-44C4-99F0-898FF83CD003}" type="datetimeFigureOut">
               <a:rPr lang="de-DE" smtClean="0"/>
-              <a:t>17.04.2023</a:t>
+              <a:t>20.09.2024</a:t>
             </a:fld>
             <a:endParaRPr lang="de-DE"/>
           </a:p>
@@ -414,7 +415,7 @@
           <a:p>
             <a:fld id="{F39F49B5-785A-44C4-99F0-898FF83CD003}" type="datetimeFigureOut">
               <a:rPr lang="de-DE" smtClean="0"/>
-              <a:t>17.04.2023</a:t>
+              <a:t>20.09.2024</a:t>
             </a:fld>
             <a:endParaRPr lang="de-DE"/>
           </a:p>
@@ -594,7 +595,7 @@
           <a:p>
             <a:fld id="{F39F49B5-785A-44C4-99F0-898FF83CD003}" type="datetimeFigureOut">
               <a:rPr lang="de-DE" smtClean="0"/>
-              <a:t>17.04.2023</a:t>
+              <a:t>20.09.2024</a:t>
             </a:fld>
             <a:endParaRPr lang="de-DE"/>
           </a:p>
@@ -764,7 +765,7 @@
           <a:p>
             <a:fld id="{F39F49B5-785A-44C4-99F0-898FF83CD003}" type="datetimeFigureOut">
               <a:rPr lang="de-DE" smtClean="0"/>
-              <a:t>17.04.2023</a:t>
+              <a:t>20.09.2024</a:t>
             </a:fld>
             <a:endParaRPr lang="de-DE"/>
           </a:p>
@@ -1008,7 +1009,7 @@
           <a:p>
             <a:fld id="{F39F49B5-785A-44C4-99F0-898FF83CD003}" type="datetimeFigureOut">
               <a:rPr lang="de-DE" smtClean="0"/>
-              <a:t>17.04.2023</a:t>
+              <a:t>20.09.2024</a:t>
             </a:fld>
             <a:endParaRPr lang="de-DE"/>
           </a:p>
@@ -1240,7 +1241,7 @@
           <a:p>
             <a:fld id="{F39F49B5-785A-44C4-99F0-898FF83CD003}" type="datetimeFigureOut">
               <a:rPr lang="de-DE" smtClean="0"/>
-              <a:t>17.04.2023</a:t>
+              <a:t>20.09.2024</a:t>
             </a:fld>
             <a:endParaRPr lang="de-DE"/>
           </a:p>
@@ -1607,7 +1608,7 @@
           <a:p>
             <a:fld id="{F39F49B5-785A-44C4-99F0-898FF83CD003}" type="datetimeFigureOut">
               <a:rPr lang="de-DE" smtClean="0"/>
-              <a:t>17.04.2023</a:t>
+              <a:t>20.09.2024</a:t>
             </a:fld>
             <a:endParaRPr lang="de-DE"/>
           </a:p>
@@ -1725,7 +1726,7 @@
           <a:p>
             <a:fld id="{F39F49B5-785A-44C4-99F0-898FF83CD003}" type="datetimeFigureOut">
               <a:rPr lang="de-DE" smtClean="0"/>
-              <a:t>17.04.2023</a:t>
+              <a:t>20.09.2024</a:t>
             </a:fld>
             <a:endParaRPr lang="de-DE"/>
           </a:p>
@@ -1820,7 +1821,7 @@
           <a:p>
             <a:fld id="{F39F49B5-785A-44C4-99F0-898FF83CD003}" type="datetimeFigureOut">
               <a:rPr lang="de-DE" smtClean="0"/>
-              <a:t>17.04.2023</a:t>
+              <a:t>20.09.2024</a:t>
             </a:fld>
             <a:endParaRPr lang="de-DE"/>
           </a:p>
@@ -2097,7 +2098,7 @@
           <a:p>
             <a:fld id="{F39F49B5-785A-44C4-99F0-898FF83CD003}" type="datetimeFigureOut">
               <a:rPr lang="de-DE" smtClean="0"/>
-              <a:t>17.04.2023</a:t>
+              <a:t>20.09.2024</a:t>
             </a:fld>
             <a:endParaRPr lang="de-DE"/>
           </a:p>
@@ -2354,7 +2355,7 @@
           <a:p>
             <a:fld id="{F39F49B5-785A-44C4-99F0-898FF83CD003}" type="datetimeFigureOut">
               <a:rPr lang="de-DE" smtClean="0"/>
-              <a:t>17.04.2023</a:t>
+              <a:t>20.09.2024</a:t>
             </a:fld>
             <a:endParaRPr lang="de-DE"/>
           </a:p>
@@ -2567,7 +2568,7 @@
           <a:p>
             <a:fld id="{F39F49B5-785A-44C4-99F0-898FF83CD003}" type="datetimeFigureOut">
               <a:rPr lang="de-DE" smtClean="0"/>
-              <a:t>17.04.2023</a:t>
+              <a:t>20.09.2024</a:t>
             </a:fld>
             <a:endParaRPr lang="de-DE"/>
           </a:p>
@@ -5523,6 +5524,1973 @@
 </p:sld>
 </file>
 
+<file path=ppt/slides/slide3.xml><?xml version="1.0" encoding="utf-8"?>
+<p:sld xmlns:a="http://schemas.openxmlformats.org/drawingml/2006/main" xmlns:r="http://schemas.openxmlformats.org/officeDocument/2006/relationships" xmlns:p="http://schemas.openxmlformats.org/presentationml/2006/main">
+  <p:cSld>
+    <p:spTree>
+      <p:nvGrpSpPr>
+        <p:cNvPr id="1" name=""/>
+        <p:cNvGrpSpPr/>
+        <p:nvPr/>
+      </p:nvGrpSpPr>
+      <p:grpSpPr>
+        <a:xfrm>
+          <a:off x="0" y="0"/>
+          <a:ext cx="0" cy="0"/>
+          <a:chOff x="0" y="0"/>
+          <a:chExt cx="0" cy="0"/>
+        </a:xfrm>
+      </p:grpSpPr>
+      <p:sp>
+        <p:nvSpPr>
+          <p:cNvPr id="5" name="Rechteck 4">
+            <a:extLst>
+              <a:ext uri="{FF2B5EF4-FFF2-40B4-BE49-F238E27FC236}">
+                <a16:creationId xmlns:a16="http://schemas.microsoft.com/office/drawing/2014/main" id="{1FF99D65-CB91-44AA-BA4C-AB35E4A69FE1}"/>
+              </a:ext>
+            </a:extLst>
+          </p:cNvPr>
+          <p:cNvSpPr/>
+          <p:nvPr/>
+        </p:nvSpPr>
+        <p:spPr>
+          <a:xfrm>
+            <a:off x="7800975" y="2400300"/>
+            <a:ext cx="1800000" cy="1800000"/>
+          </a:xfrm>
+          <a:prstGeom prst="rect">
+            <a:avLst/>
+          </a:prstGeom>
+          <a:noFill/>
+          <a:ln w="57150">
+            <a:solidFill>
+              <a:schemeClr val="tx1"/>
+            </a:solidFill>
+          </a:ln>
+        </p:spPr>
+        <p:style>
+          <a:lnRef idx="2">
+            <a:schemeClr val="accent1">
+              <a:shade val="50000"/>
+            </a:schemeClr>
+          </a:lnRef>
+          <a:fillRef idx="1">
+            <a:schemeClr val="accent1"/>
+          </a:fillRef>
+          <a:effectRef idx="0">
+            <a:schemeClr val="accent1"/>
+          </a:effectRef>
+          <a:fontRef idx="minor">
+            <a:schemeClr val="lt1"/>
+          </a:fontRef>
+        </p:style>
+        <p:txBody>
+          <a:bodyPr rtlCol="0" anchor="ctr"/>
+          <a:lstStyle/>
+          <a:p>
+            <a:pPr algn="ctr"/>
+            <a:endParaRPr lang="de-DE"/>
+          </a:p>
+        </p:txBody>
+      </p:sp>
+      <p:sp>
+        <p:nvSpPr>
+          <p:cNvPr id="6" name="Rechteck 5">
+            <a:extLst>
+              <a:ext uri="{FF2B5EF4-FFF2-40B4-BE49-F238E27FC236}">
+                <a16:creationId xmlns:a16="http://schemas.microsoft.com/office/drawing/2014/main" id="{DE91A9A1-B8DA-4F74-809B-F3D31B2EB188}"/>
+              </a:ext>
+            </a:extLst>
+          </p:cNvPr>
+          <p:cNvSpPr/>
+          <p:nvPr/>
+        </p:nvSpPr>
+        <p:spPr>
+          <a:xfrm>
+            <a:off x="9600975" y="2400300"/>
+            <a:ext cx="1800000" cy="1800000"/>
+          </a:xfrm>
+          <a:prstGeom prst="rect">
+            <a:avLst/>
+          </a:prstGeom>
+          <a:noFill/>
+          <a:ln w="57150">
+            <a:solidFill>
+              <a:schemeClr val="tx1"/>
+            </a:solidFill>
+          </a:ln>
+        </p:spPr>
+        <p:style>
+          <a:lnRef idx="2">
+            <a:schemeClr val="accent1">
+              <a:shade val="50000"/>
+            </a:schemeClr>
+          </a:lnRef>
+          <a:fillRef idx="1">
+            <a:schemeClr val="accent1"/>
+          </a:fillRef>
+          <a:effectRef idx="0">
+            <a:schemeClr val="accent1"/>
+          </a:effectRef>
+          <a:fontRef idx="minor">
+            <a:schemeClr val="lt1"/>
+          </a:fontRef>
+        </p:style>
+        <p:txBody>
+          <a:bodyPr rtlCol="0" anchor="ctr"/>
+          <a:lstStyle/>
+          <a:p>
+            <a:pPr algn="ctr"/>
+            <a:endParaRPr lang="de-DE"/>
+          </a:p>
+        </p:txBody>
+      </p:sp>
+      <p:sp>
+        <p:nvSpPr>
+          <p:cNvPr id="7" name="Rechteck 6">
+            <a:extLst>
+              <a:ext uri="{FF2B5EF4-FFF2-40B4-BE49-F238E27FC236}">
+                <a16:creationId xmlns:a16="http://schemas.microsoft.com/office/drawing/2014/main" id="{201B4A78-4FB3-4C6A-9500-19CBC0E81687}"/>
+              </a:ext>
+            </a:extLst>
+          </p:cNvPr>
+          <p:cNvSpPr/>
+          <p:nvPr/>
+        </p:nvSpPr>
+        <p:spPr>
+          <a:xfrm>
+            <a:off x="11400975" y="2400300"/>
+            <a:ext cx="1800000" cy="1800000"/>
+          </a:xfrm>
+          <a:prstGeom prst="rect">
+            <a:avLst/>
+          </a:prstGeom>
+          <a:noFill/>
+          <a:ln w="57150">
+            <a:solidFill>
+              <a:schemeClr val="tx1"/>
+            </a:solidFill>
+          </a:ln>
+        </p:spPr>
+        <p:style>
+          <a:lnRef idx="2">
+            <a:schemeClr val="accent1">
+              <a:shade val="50000"/>
+            </a:schemeClr>
+          </a:lnRef>
+          <a:fillRef idx="1">
+            <a:schemeClr val="accent1"/>
+          </a:fillRef>
+          <a:effectRef idx="0">
+            <a:schemeClr val="accent1"/>
+          </a:effectRef>
+          <a:fontRef idx="minor">
+            <a:schemeClr val="lt1"/>
+          </a:fontRef>
+        </p:style>
+        <p:txBody>
+          <a:bodyPr rtlCol="0" anchor="ctr"/>
+          <a:lstStyle/>
+          <a:p>
+            <a:pPr algn="ctr"/>
+            <a:endParaRPr lang="de-DE"/>
+          </a:p>
+        </p:txBody>
+      </p:sp>
+      <p:sp>
+        <p:nvSpPr>
+          <p:cNvPr id="8" name="Rechteck 7">
+            <a:extLst>
+              <a:ext uri="{FF2B5EF4-FFF2-40B4-BE49-F238E27FC236}">
+                <a16:creationId xmlns:a16="http://schemas.microsoft.com/office/drawing/2014/main" id="{03495204-24FC-4DC3-9EA7-669C7E62514B}"/>
+              </a:ext>
+            </a:extLst>
+          </p:cNvPr>
+          <p:cNvSpPr/>
+          <p:nvPr/>
+        </p:nvSpPr>
+        <p:spPr>
+          <a:xfrm>
+            <a:off x="13200975" y="2400300"/>
+            <a:ext cx="1800000" cy="1800000"/>
+          </a:xfrm>
+          <a:prstGeom prst="rect">
+            <a:avLst/>
+          </a:prstGeom>
+          <a:noFill/>
+          <a:ln w="57150">
+            <a:solidFill>
+              <a:schemeClr val="tx1"/>
+            </a:solidFill>
+          </a:ln>
+        </p:spPr>
+        <p:style>
+          <a:lnRef idx="2">
+            <a:schemeClr val="accent1">
+              <a:shade val="50000"/>
+            </a:schemeClr>
+          </a:lnRef>
+          <a:fillRef idx="1">
+            <a:schemeClr val="accent1"/>
+          </a:fillRef>
+          <a:effectRef idx="0">
+            <a:schemeClr val="accent1"/>
+          </a:effectRef>
+          <a:fontRef idx="minor">
+            <a:schemeClr val="lt1"/>
+          </a:fontRef>
+        </p:style>
+        <p:txBody>
+          <a:bodyPr rtlCol="0" anchor="ctr"/>
+          <a:lstStyle/>
+          <a:p>
+            <a:pPr algn="ctr"/>
+            <a:endParaRPr lang="de-DE"/>
+          </a:p>
+        </p:txBody>
+      </p:sp>
+      <p:sp>
+        <p:nvSpPr>
+          <p:cNvPr id="9" name="Rechteck 8">
+            <a:extLst>
+              <a:ext uri="{FF2B5EF4-FFF2-40B4-BE49-F238E27FC236}">
+                <a16:creationId xmlns:a16="http://schemas.microsoft.com/office/drawing/2014/main" id="{D4932930-6F9E-4F8C-A725-59F59ADAE683}"/>
+              </a:ext>
+            </a:extLst>
+          </p:cNvPr>
+          <p:cNvSpPr/>
+          <p:nvPr/>
+        </p:nvSpPr>
+        <p:spPr>
+          <a:xfrm>
+            <a:off x="15000975" y="2400300"/>
+            <a:ext cx="1800000" cy="1800000"/>
+          </a:xfrm>
+          <a:prstGeom prst="rect">
+            <a:avLst/>
+          </a:prstGeom>
+          <a:noFill/>
+          <a:ln w="57150">
+            <a:solidFill>
+              <a:schemeClr val="tx1"/>
+            </a:solidFill>
+          </a:ln>
+        </p:spPr>
+        <p:style>
+          <a:lnRef idx="2">
+            <a:schemeClr val="accent1">
+              <a:shade val="50000"/>
+            </a:schemeClr>
+          </a:lnRef>
+          <a:fillRef idx="1">
+            <a:schemeClr val="accent1"/>
+          </a:fillRef>
+          <a:effectRef idx="0">
+            <a:schemeClr val="accent1"/>
+          </a:effectRef>
+          <a:fontRef idx="minor">
+            <a:schemeClr val="lt1"/>
+          </a:fontRef>
+        </p:style>
+        <p:txBody>
+          <a:bodyPr rtlCol="0" anchor="ctr"/>
+          <a:lstStyle/>
+          <a:p>
+            <a:pPr algn="ctr"/>
+            <a:endParaRPr lang="de-DE"/>
+          </a:p>
+        </p:txBody>
+      </p:sp>
+      <p:sp>
+        <p:nvSpPr>
+          <p:cNvPr id="10" name="Rechteck 9">
+            <a:extLst>
+              <a:ext uri="{FF2B5EF4-FFF2-40B4-BE49-F238E27FC236}">
+                <a16:creationId xmlns:a16="http://schemas.microsoft.com/office/drawing/2014/main" id="{1C426864-952B-4363-90AD-C035DCC18900}"/>
+              </a:ext>
+            </a:extLst>
+          </p:cNvPr>
+          <p:cNvSpPr/>
+          <p:nvPr/>
+        </p:nvSpPr>
+        <p:spPr>
+          <a:xfrm>
+            <a:off x="16800975" y="2400300"/>
+            <a:ext cx="1800000" cy="1800000"/>
+          </a:xfrm>
+          <a:prstGeom prst="rect">
+            <a:avLst/>
+          </a:prstGeom>
+          <a:noFill/>
+          <a:ln w="57150">
+            <a:solidFill>
+              <a:schemeClr val="tx1"/>
+            </a:solidFill>
+          </a:ln>
+        </p:spPr>
+        <p:style>
+          <a:lnRef idx="2">
+            <a:schemeClr val="accent1">
+              <a:shade val="50000"/>
+            </a:schemeClr>
+          </a:lnRef>
+          <a:fillRef idx="1">
+            <a:schemeClr val="accent1"/>
+          </a:fillRef>
+          <a:effectRef idx="0">
+            <a:schemeClr val="accent1"/>
+          </a:effectRef>
+          <a:fontRef idx="minor">
+            <a:schemeClr val="lt1"/>
+          </a:fontRef>
+        </p:style>
+        <p:txBody>
+          <a:bodyPr rtlCol="0" anchor="ctr"/>
+          <a:lstStyle/>
+          <a:p>
+            <a:pPr algn="ctr"/>
+            <a:endParaRPr lang="de-DE"/>
+          </a:p>
+        </p:txBody>
+      </p:sp>
+      <p:sp>
+        <p:nvSpPr>
+          <p:cNvPr id="11" name="Rechteck 10">
+            <a:extLst>
+              <a:ext uri="{FF2B5EF4-FFF2-40B4-BE49-F238E27FC236}">
+                <a16:creationId xmlns:a16="http://schemas.microsoft.com/office/drawing/2014/main" id="{0D302E27-AD1D-4EBF-B45B-B0441F351AB4}"/>
+              </a:ext>
+            </a:extLst>
+          </p:cNvPr>
+          <p:cNvSpPr/>
+          <p:nvPr/>
+        </p:nvSpPr>
+        <p:spPr>
+          <a:xfrm>
+            <a:off x="18600975" y="2400300"/>
+            <a:ext cx="1800000" cy="1800000"/>
+          </a:xfrm>
+          <a:prstGeom prst="rect">
+            <a:avLst/>
+          </a:prstGeom>
+          <a:noFill/>
+          <a:ln w="57150">
+            <a:solidFill>
+              <a:schemeClr val="tx1"/>
+            </a:solidFill>
+          </a:ln>
+        </p:spPr>
+        <p:style>
+          <a:lnRef idx="2">
+            <a:schemeClr val="accent1">
+              <a:shade val="50000"/>
+            </a:schemeClr>
+          </a:lnRef>
+          <a:fillRef idx="1">
+            <a:schemeClr val="accent1"/>
+          </a:fillRef>
+          <a:effectRef idx="0">
+            <a:schemeClr val="accent1"/>
+          </a:effectRef>
+          <a:fontRef idx="minor">
+            <a:schemeClr val="lt1"/>
+          </a:fontRef>
+        </p:style>
+        <p:txBody>
+          <a:bodyPr rtlCol="0" anchor="ctr"/>
+          <a:lstStyle/>
+          <a:p>
+            <a:pPr algn="ctr"/>
+            <a:endParaRPr lang="de-DE"/>
+          </a:p>
+        </p:txBody>
+      </p:sp>
+      <p:sp>
+        <p:nvSpPr>
+          <p:cNvPr id="12" name="Rechteck 11">
+            <a:extLst>
+              <a:ext uri="{FF2B5EF4-FFF2-40B4-BE49-F238E27FC236}">
+                <a16:creationId xmlns:a16="http://schemas.microsoft.com/office/drawing/2014/main" id="{16AB32BD-0852-4B85-8E12-59FCE0639CF3}"/>
+              </a:ext>
+            </a:extLst>
+          </p:cNvPr>
+          <p:cNvSpPr/>
+          <p:nvPr/>
+        </p:nvSpPr>
+        <p:spPr>
+          <a:xfrm>
+            <a:off x="20400975" y="2400300"/>
+            <a:ext cx="1800000" cy="1800000"/>
+          </a:xfrm>
+          <a:prstGeom prst="rect">
+            <a:avLst/>
+          </a:prstGeom>
+          <a:noFill/>
+          <a:ln w="57150">
+            <a:solidFill>
+              <a:schemeClr val="tx1"/>
+            </a:solidFill>
+          </a:ln>
+        </p:spPr>
+        <p:style>
+          <a:lnRef idx="2">
+            <a:schemeClr val="accent1">
+              <a:shade val="50000"/>
+            </a:schemeClr>
+          </a:lnRef>
+          <a:fillRef idx="1">
+            <a:schemeClr val="accent1"/>
+          </a:fillRef>
+          <a:effectRef idx="0">
+            <a:schemeClr val="accent1"/>
+          </a:effectRef>
+          <a:fontRef idx="minor">
+            <a:schemeClr val="lt1"/>
+          </a:fontRef>
+        </p:style>
+        <p:txBody>
+          <a:bodyPr rtlCol="0" anchor="ctr"/>
+          <a:lstStyle/>
+          <a:p>
+            <a:pPr algn="ctr"/>
+            <a:endParaRPr lang="de-DE"/>
+          </a:p>
+        </p:txBody>
+      </p:sp>
+      <p:sp>
+        <p:nvSpPr>
+          <p:cNvPr id="14" name="Rechteck 13">
+            <a:extLst>
+              <a:ext uri="{FF2B5EF4-FFF2-40B4-BE49-F238E27FC236}">
+                <a16:creationId xmlns:a16="http://schemas.microsoft.com/office/drawing/2014/main" id="{F5A9147B-56DB-4AF9-A194-A5533EFAE8A7}"/>
+              </a:ext>
+            </a:extLst>
+          </p:cNvPr>
+          <p:cNvSpPr/>
+          <p:nvPr/>
+        </p:nvSpPr>
+        <p:spPr>
+          <a:xfrm>
+            <a:off x="9600975" y="4724400"/>
+            <a:ext cx="1800000" cy="1800000"/>
+          </a:xfrm>
+          <a:prstGeom prst="rect">
+            <a:avLst/>
+          </a:prstGeom>
+          <a:noFill/>
+          <a:ln w="57150">
+            <a:solidFill>
+              <a:schemeClr val="tx1"/>
+            </a:solidFill>
+          </a:ln>
+        </p:spPr>
+        <p:style>
+          <a:lnRef idx="2">
+            <a:schemeClr val="accent1">
+              <a:shade val="50000"/>
+            </a:schemeClr>
+          </a:lnRef>
+          <a:fillRef idx="1">
+            <a:schemeClr val="accent1"/>
+          </a:fillRef>
+          <a:effectRef idx="0">
+            <a:schemeClr val="accent1"/>
+          </a:effectRef>
+          <a:fontRef idx="minor">
+            <a:schemeClr val="lt1"/>
+          </a:fontRef>
+        </p:style>
+        <p:txBody>
+          <a:bodyPr rtlCol="0" anchor="ctr"/>
+          <a:lstStyle/>
+          <a:p>
+            <a:pPr algn="ctr"/>
+            <a:endParaRPr lang="de-DE"/>
+          </a:p>
+        </p:txBody>
+      </p:sp>
+      <p:sp>
+        <p:nvSpPr>
+          <p:cNvPr id="15" name="Rechteck 14">
+            <a:extLst>
+              <a:ext uri="{FF2B5EF4-FFF2-40B4-BE49-F238E27FC236}">
+                <a16:creationId xmlns:a16="http://schemas.microsoft.com/office/drawing/2014/main" id="{E11D9F23-8E8D-4471-9DC9-724B08762C43}"/>
+              </a:ext>
+            </a:extLst>
+          </p:cNvPr>
+          <p:cNvSpPr/>
+          <p:nvPr/>
+        </p:nvSpPr>
+        <p:spPr>
+          <a:xfrm>
+            <a:off x="11400975" y="4724400"/>
+            <a:ext cx="1800000" cy="1800000"/>
+          </a:xfrm>
+          <a:prstGeom prst="rect">
+            <a:avLst/>
+          </a:prstGeom>
+          <a:noFill/>
+          <a:ln w="57150">
+            <a:solidFill>
+              <a:schemeClr val="tx1"/>
+            </a:solidFill>
+          </a:ln>
+        </p:spPr>
+        <p:style>
+          <a:lnRef idx="2">
+            <a:schemeClr val="accent1">
+              <a:shade val="50000"/>
+            </a:schemeClr>
+          </a:lnRef>
+          <a:fillRef idx="1">
+            <a:schemeClr val="accent1"/>
+          </a:fillRef>
+          <a:effectRef idx="0">
+            <a:schemeClr val="accent1"/>
+          </a:effectRef>
+          <a:fontRef idx="minor">
+            <a:schemeClr val="lt1"/>
+          </a:fontRef>
+        </p:style>
+        <p:txBody>
+          <a:bodyPr rtlCol="0" anchor="ctr"/>
+          <a:lstStyle/>
+          <a:p>
+            <a:pPr algn="ctr"/>
+            <a:endParaRPr lang="de-DE"/>
+          </a:p>
+        </p:txBody>
+      </p:sp>
+      <p:sp>
+        <p:nvSpPr>
+          <p:cNvPr id="16" name="Rechteck 15">
+            <a:extLst>
+              <a:ext uri="{FF2B5EF4-FFF2-40B4-BE49-F238E27FC236}">
+                <a16:creationId xmlns:a16="http://schemas.microsoft.com/office/drawing/2014/main" id="{074CCCC8-7F41-4293-A5A6-E471AF302169}"/>
+              </a:ext>
+            </a:extLst>
+          </p:cNvPr>
+          <p:cNvSpPr/>
+          <p:nvPr/>
+        </p:nvSpPr>
+        <p:spPr>
+          <a:xfrm>
+            <a:off x="13200975" y="4724400"/>
+            <a:ext cx="1800000" cy="1800000"/>
+          </a:xfrm>
+          <a:prstGeom prst="rect">
+            <a:avLst/>
+          </a:prstGeom>
+          <a:noFill/>
+          <a:ln w="57150">
+            <a:solidFill>
+              <a:schemeClr val="tx1"/>
+            </a:solidFill>
+          </a:ln>
+        </p:spPr>
+        <p:style>
+          <a:lnRef idx="2">
+            <a:schemeClr val="accent1">
+              <a:shade val="50000"/>
+            </a:schemeClr>
+          </a:lnRef>
+          <a:fillRef idx="1">
+            <a:schemeClr val="accent1"/>
+          </a:fillRef>
+          <a:effectRef idx="0">
+            <a:schemeClr val="accent1"/>
+          </a:effectRef>
+          <a:fontRef idx="minor">
+            <a:schemeClr val="lt1"/>
+          </a:fontRef>
+        </p:style>
+        <p:txBody>
+          <a:bodyPr rtlCol="0" anchor="ctr"/>
+          <a:lstStyle/>
+          <a:p>
+            <a:pPr algn="ctr"/>
+            <a:endParaRPr lang="de-DE"/>
+          </a:p>
+        </p:txBody>
+      </p:sp>
+      <p:sp>
+        <p:nvSpPr>
+          <p:cNvPr id="17" name="Rechteck 16">
+            <a:extLst>
+              <a:ext uri="{FF2B5EF4-FFF2-40B4-BE49-F238E27FC236}">
+                <a16:creationId xmlns:a16="http://schemas.microsoft.com/office/drawing/2014/main" id="{B36A6532-6804-4240-BBE3-91A2A36412A5}"/>
+              </a:ext>
+            </a:extLst>
+          </p:cNvPr>
+          <p:cNvSpPr/>
+          <p:nvPr/>
+        </p:nvSpPr>
+        <p:spPr>
+          <a:xfrm>
+            <a:off x="15000975" y="4724400"/>
+            <a:ext cx="1800000" cy="1800000"/>
+          </a:xfrm>
+          <a:prstGeom prst="rect">
+            <a:avLst/>
+          </a:prstGeom>
+          <a:noFill/>
+          <a:ln w="57150">
+            <a:solidFill>
+              <a:schemeClr val="tx1"/>
+            </a:solidFill>
+          </a:ln>
+        </p:spPr>
+        <p:style>
+          <a:lnRef idx="2">
+            <a:schemeClr val="accent1">
+              <a:shade val="50000"/>
+            </a:schemeClr>
+          </a:lnRef>
+          <a:fillRef idx="1">
+            <a:schemeClr val="accent1"/>
+          </a:fillRef>
+          <a:effectRef idx="0">
+            <a:schemeClr val="accent1"/>
+          </a:effectRef>
+          <a:fontRef idx="minor">
+            <a:schemeClr val="lt1"/>
+          </a:fontRef>
+        </p:style>
+        <p:txBody>
+          <a:bodyPr rtlCol="0" anchor="ctr"/>
+          <a:lstStyle/>
+          <a:p>
+            <a:pPr algn="ctr"/>
+            <a:endParaRPr lang="de-DE"/>
+          </a:p>
+        </p:txBody>
+      </p:sp>
+      <p:sp>
+        <p:nvSpPr>
+          <p:cNvPr id="18" name="Rechteck 17">
+            <a:extLst>
+              <a:ext uri="{FF2B5EF4-FFF2-40B4-BE49-F238E27FC236}">
+                <a16:creationId xmlns:a16="http://schemas.microsoft.com/office/drawing/2014/main" id="{7C63E9CC-55E9-4445-9343-E0D829E1CD8A}"/>
+              </a:ext>
+            </a:extLst>
+          </p:cNvPr>
+          <p:cNvSpPr/>
+          <p:nvPr/>
+        </p:nvSpPr>
+        <p:spPr>
+          <a:xfrm>
+            <a:off x="16800975" y="4724400"/>
+            <a:ext cx="1800000" cy="1800000"/>
+          </a:xfrm>
+          <a:prstGeom prst="rect">
+            <a:avLst/>
+          </a:prstGeom>
+          <a:noFill/>
+          <a:ln w="57150">
+            <a:solidFill>
+              <a:schemeClr val="tx1"/>
+            </a:solidFill>
+          </a:ln>
+        </p:spPr>
+        <p:style>
+          <a:lnRef idx="2">
+            <a:schemeClr val="accent1">
+              <a:shade val="50000"/>
+            </a:schemeClr>
+          </a:lnRef>
+          <a:fillRef idx="1">
+            <a:schemeClr val="accent1"/>
+          </a:fillRef>
+          <a:effectRef idx="0">
+            <a:schemeClr val="accent1"/>
+          </a:effectRef>
+          <a:fontRef idx="minor">
+            <a:schemeClr val="lt1"/>
+          </a:fontRef>
+        </p:style>
+        <p:txBody>
+          <a:bodyPr rtlCol="0" anchor="ctr"/>
+          <a:lstStyle/>
+          <a:p>
+            <a:pPr algn="ctr"/>
+            <a:endParaRPr lang="de-DE"/>
+          </a:p>
+        </p:txBody>
+      </p:sp>
+      <p:sp>
+        <p:nvSpPr>
+          <p:cNvPr id="19" name="Rechteck 18">
+            <a:extLst>
+              <a:ext uri="{FF2B5EF4-FFF2-40B4-BE49-F238E27FC236}">
+                <a16:creationId xmlns:a16="http://schemas.microsoft.com/office/drawing/2014/main" id="{B8FCDC8B-06BA-4F4F-9F27-E81893EE13E3}"/>
+              </a:ext>
+            </a:extLst>
+          </p:cNvPr>
+          <p:cNvSpPr/>
+          <p:nvPr/>
+        </p:nvSpPr>
+        <p:spPr>
+          <a:xfrm>
+            <a:off x="18600975" y="4724400"/>
+            <a:ext cx="1800000" cy="1800000"/>
+          </a:xfrm>
+          <a:prstGeom prst="rect">
+            <a:avLst/>
+          </a:prstGeom>
+          <a:noFill/>
+          <a:ln w="57150">
+            <a:solidFill>
+              <a:schemeClr val="tx1"/>
+            </a:solidFill>
+          </a:ln>
+        </p:spPr>
+        <p:style>
+          <a:lnRef idx="2">
+            <a:schemeClr val="accent1">
+              <a:shade val="50000"/>
+            </a:schemeClr>
+          </a:lnRef>
+          <a:fillRef idx="1">
+            <a:schemeClr val="accent1"/>
+          </a:fillRef>
+          <a:effectRef idx="0">
+            <a:schemeClr val="accent1"/>
+          </a:effectRef>
+          <a:fontRef idx="minor">
+            <a:schemeClr val="lt1"/>
+          </a:fontRef>
+        </p:style>
+        <p:txBody>
+          <a:bodyPr rtlCol="0" anchor="ctr"/>
+          <a:lstStyle/>
+          <a:p>
+            <a:pPr algn="ctr"/>
+            <a:endParaRPr lang="de-DE"/>
+          </a:p>
+        </p:txBody>
+      </p:sp>
+      <p:sp>
+        <p:nvSpPr>
+          <p:cNvPr id="23" name="Rechteck 22">
+            <a:extLst>
+              <a:ext uri="{FF2B5EF4-FFF2-40B4-BE49-F238E27FC236}">
+                <a16:creationId xmlns:a16="http://schemas.microsoft.com/office/drawing/2014/main" id="{922A3E18-2EED-4DC3-AF75-EED68AE9DEF7}"/>
+              </a:ext>
+            </a:extLst>
+          </p:cNvPr>
+          <p:cNvSpPr/>
+          <p:nvPr/>
+        </p:nvSpPr>
+        <p:spPr>
+          <a:xfrm>
+            <a:off x="11400975" y="7048500"/>
+            <a:ext cx="1800000" cy="1800000"/>
+          </a:xfrm>
+          <a:prstGeom prst="rect">
+            <a:avLst/>
+          </a:prstGeom>
+          <a:noFill/>
+          <a:ln w="57150">
+            <a:solidFill>
+              <a:schemeClr val="tx1"/>
+            </a:solidFill>
+          </a:ln>
+        </p:spPr>
+        <p:style>
+          <a:lnRef idx="2">
+            <a:schemeClr val="accent1">
+              <a:shade val="50000"/>
+            </a:schemeClr>
+          </a:lnRef>
+          <a:fillRef idx="1">
+            <a:schemeClr val="accent1"/>
+          </a:fillRef>
+          <a:effectRef idx="0">
+            <a:schemeClr val="accent1"/>
+          </a:effectRef>
+          <a:fontRef idx="minor">
+            <a:schemeClr val="lt1"/>
+          </a:fontRef>
+        </p:style>
+        <p:txBody>
+          <a:bodyPr rtlCol="0" anchor="ctr"/>
+          <a:lstStyle/>
+          <a:p>
+            <a:pPr algn="ctr"/>
+            <a:endParaRPr lang="de-DE"/>
+          </a:p>
+        </p:txBody>
+      </p:sp>
+      <p:sp>
+        <p:nvSpPr>
+          <p:cNvPr id="24" name="Rechteck 23">
+            <a:extLst>
+              <a:ext uri="{FF2B5EF4-FFF2-40B4-BE49-F238E27FC236}">
+                <a16:creationId xmlns:a16="http://schemas.microsoft.com/office/drawing/2014/main" id="{B108274E-F46F-475B-B51E-71944B1EBD36}"/>
+              </a:ext>
+            </a:extLst>
+          </p:cNvPr>
+          <p:cNvSpPr/>
+          <p:nvPr/>
+        </p:nvSpPr>
+        <p:spPr>
+          <a:xfrm>
+            <a:off x="13200975" y="7048500"/>
+            <a:ext cx="1800000" cy="1800000"/>
+          </a:xfrm>
+          <a:prstGeom prst="rect">
+            <a:avLst/>
+          </a:prstGeom>
+          <a:noFill/>
+          <a:ln w="57150">
+            <a:solidFill>
+              <a:schemeClr val="tx1"/>
+            </a:solidFill>
+          </a:ln>
+        </p:spPr>
+        <p:style>
+          <a:lnRef idx="2">
+            <a:schemeClr val="accent1">
+              <a:shade val="50000"/>
+            </a:schemeClr>
+          </a:lnRef>
+          <a:fillRef idx="1">
+            <a:schemeClr val="accent1"/>
+          </a:fillRef>
+          <a:effectRef idx="0">
+            <a:schemeClr val="accent1"/>
+          </a:effectRef>
+          <a:fontRef idx="minor">
+            <a:schemeClr val="lt1"/>
+          </a:fontRef>
+        </p:style>
+        <p:txBody>
+          <a:bodyPr rtlCol="0" anchor="ctr"/>
+          <a:lstStyle/>
+          <a:p>
+            <a:pPr algn="ctr"/>
+            <a:endParaRPr lang="de-DE"/>
+          </a:p>
+        </p:txBody>
+      </p:sp>
+      <p:sp>
+        <p:nvSpPr>
+          <p:cNvPr id="25" name="Rechteck 24">
+            <a:extLst>
+              <a:ext uri="{FF2B5EF4-FFF2-40B4-BE49-F238E27FC236}">
+                <a16:creationId xmlns:a16="http://schemas.microsoft.com/office/drawing/2014/main" id="{409E576E-97DD-48F7-806D-FDE4510C8309}"/>
+              </a:ext>
+            </a:extLst>
+          </p:cNvPr>
+          <p:cNvSpPr/>
+          <p:nvPr/>
+        </p:nvSpPr>
+        <p:spPr>
+          <a:xfrm>
+            <a:off x="15000975" y="7048500"/>
+            <a:ext cx="1800000" cy="1800000"/>
+          </a:xfrm>
+          <a:prstGeom prst="rect">
+            <a:avLst/>
+          </a:prstGeom>
+          <a:noFill/>
+          <a:ln w="57150">
+            <a:solidFill>
+              <a:schemeClr val="tx1"/>
+            </a:solidFill>
+          </a:ln>
+        </p:spPr>
+        <p:style>
+          <a:lnRef idx="2">
+            <a:schemeClr val="accent1">
+              <a:shade val="50000"/>
+            </a:schemeClr>
+          </a:lnRef>
+          <a:fillRef idx="1">
+            <a:schemeClr val="accent1"/>
+          </a:fillRef>
+          <a:effectRef idx="0">
+            <a:schemeClr val="accent1"/>
+          </a:effectRef>
+          <a:fontRef idx="minor">
+            <a:schemeClr val="lt1"/>
+          </a:fontRef>
+        </p:style>
+        <p:txBody>
+          <a:bodyPr rtlCol="0" anchor="ctr"/>
+          <a:lstStyle/>
+          <a:p>
+            <a:pPr algn="ctr"/>
+            <a:endParaRPr lang="de-DE"/>
+          </a:p>
+        </p:txBody>
+      </p:sp>
+      <p:sp>
+        <p:nvSpPr>
+          <p:cNvPr id="26" name="Rechteck 25">
+            <a:extLst>
+              <a:ext uri="{FF2B5EF4-FFF2-40B4-BE49-F238E27FC236}">
+                <a16:creationId xmlns:a16="http://schemas.microsoft.com/office/drawing/2014/main" id="{A4AAB7E5-1F2A-4199-BCAF-0AB7D3851DEF}"/>
+              </a:ext>
+            </a:extLst>
+          </p:cNvPr>
+          <p:cNvSpPr/>
+          <p:nvPr/>
+        </p:nvSpPr>
+        <p:spPr>
+          <a:xfrm>
+            <a:off x="16800975" y="7048500"/>
+            <a:ext cx="1800000" cy="1800000"/>
+          </a:xfrm>
+          <a:prstGeom prst="rect">
+            <a:avLst/>
+          </a:prstGeom>
+          <a:noFill/>
+          <a:ln w="57150">
+            <a:solidFill>
+              <a:schemeClr val="tx1"/>
+            </a:solidFill>
+          </a:ln>
+        </p:spPr>
+        <p:style>
+          <a:lnRef idx="2">
+            <a:schemeClr val="accent1">
+              <a:shade val="50000"/>
+            </a:schemeClr>
+          </a:lnRef>
+          <a:fillRef idx="1">
+            <a:schemeClr val="accent1"/>
+          </a:fillRef>
+          <a:effectRef idx="0">
+            <a:schemeClr val="accent1"/>
+          </a:effectRef>
+          <a:fontRef idx="minor">
+            <a:schemeClr val="lt1"/>
+          </a:fontRef>
+        </p:style>
+        <p:txBody>
+          <a:bodyPr rtlCol="0" anchor="ctr"/>
+          <a:lstStyle/>
+          <a:p>
+            <a:pPr algn="ctr"/>
+            <a:endParaRPr lang="de-DE"/>
+          </a:p>
+        </p:txBody>
+      </p:sp>
+      <p:sp>
+        <p:nvSpPr>
+          <p:cNvPr id="30" name="Rechteck 29">
+            <a:extLst>
+              <a:ext uri="{FF2B5EF4-FFF2-40B4-BE49-F238E27FC236}">
+                <a16:creationId xmlns:a16="http://schemas.microsoft.com/office/drawing/2014/main" id="{E3D2E501-E5B9-4C52-ADFA-A900706BF9C6}"/>
+              </a:ext>
+            </a:extLst>
+          </p:cNvPr>
+          <p:cNvSpPr/>
+          <p:nvPr/>
+        </p:nvSpPr>
+        <p:spPr>
+          <a:xfrm>
+            <a:off x="9600975" y="9372600"/>
+            <a:ext cx="1800000" cy="1800000"/>
+          </a:xfrm>
+          <a:prstGeom prst="rect">
+            <a:avLst/>
+          </a:prstGeom>
+          <a:noFill/>
+          <a:ln w="57150">
+            <a:solidFill>
+              <a:schemeClr val="tx1"/>
+            </a:solidFill>
+          </a:ln>
+        </p:spPr>
+        <p:style>
+          <a:lnRef idx="2">
+            <a:schemeClr val="accent1">
+              <a:shade val="50000"/>
+            </a:schemeClr>
+          </a:lnRef>
+          <a:fillRef idx="1">
+            <a:schemeClr val="accent1"/>
+          </a:fillRef>
+          <a:effectRef idx="0">
+            <a:schemeClr val="accent1"/>
+          </a:effectRef>
+          <a:fontRef idx="minor">
+            <a:schemeClr val="lt1"/>
+          </a:fontRef>
+        </p:style>
+        <p:txBody>
+          <a:bodyPr rtlCol="0" anchor="ctr"/>
+          <a:lstStyle/>
+          <a:p>
+            <a:pPr algn="ctr"/>
+            <a:endParaRPr lang="de-DE"/>
+          </a:p>
+        </p:txBody>
+      </p:sp>
+      <p:sp>
+        <p:nvSpPr>
+          <p:cNvPr id="31" name="Rechteck 30">
+            <a:extLst>
+              <a:ext uri="{FF2B5EF4-FFF2-40B4-BE49-F238E27FC236}">
+                <a16:creationId xmlns:a16="http://schemas.microsoft.com/office/drawing/2014/main" id="{2CDE376B-ADD4-4958-A93C-AD0F292666D6}"/>
+              </a:ext>
+            </a:extLst>
+          </p:cNvPr>
+          <p:cNvSpPr/>
+          <p:nvPr/>
+        </p:nvSpPr>
+        <p:spPr>
+          <a:xfrm>
+            <a:off x="11400975" y="9372600"/>
+            <a:ext cx="1800000" cy="1800000"/>
+          </a:xfrm>
+          <a:prstGeom prst="rect">
+            <a:avLst/>
+          </a:prstGeom>
+          <a:noFill/>
+          <a:ln w="57150">
+            <a:solidFill>
+              <a:schemeClr val="tx1"/>
+            </a:solidFill>
+          </a:ln>
+        </p:spPr>
+        <p:style>
+          <a:lnRef idx="2">
+            <a:schemeClr val="accent1">
+              <a:shade val="50000"/>
+            </a:schemeClr>
+          </a:lnRef>
+          <a:fillRef idx="1">
+            <a:schemeClr val="accent1"/>
+          </a:fillRef>
+          <a:effectRef idx="0">
+            <a:schemeClr val="accent1"/>
+          </a:effectRef>
+          <a:fontRef idx="minor">
+            <a:schemeClr val="lt1"/>
+          </a:fontRef>
+        </p:style>
+        <p:txBody>
+          <a:bodyPr rtlCol="0" anchor="ctr"/>
+          <a:lstStyle/>
+          <a:p>
+            <a:pPr algn="ctr"/>
+            <a:endParaRPr lang="de-DE"/>
+          </a:p>
+        </p:txBody>
+      </p:sp>
+      <p:sp>
+        <p:nvSpPr>
+          <p:cNvPr id="32" name="Rechteck 31">
+            <a:extLst>
+              <a:ext uri="{FF2B5EF4-FFF2-40B4-BE49-F238E27FC236}">
+                <a16:creationId xmlns:a16="http://schemas.microsoft.com/office/drawing/2014/main" id="{5424ED28-9B30-413B-B0F6-8E931A455F5D}"/>
+              </a:ext>
+            </a:extLst>
+          </p:cNvPr>
+          <p:cNvSpPr/>
+          <p:nvPr/>
+        </p:nvSpPr>
+        <p:spPr>
+          <a:xfrm>
+            <a:off x="13200975" y="9372600"/>
+            <a:ext cx="1800000" cy="1800000"/>
+          </a:xfrm>
+          <a:prstGeom prst="rect">
+            <a:avLst/>
+          </a:prstGeom>
+          <a:noFill/>
+          <a:ln w="57150">
+            <a:solidFill>
+              <a:schemeClr val="tx1"/>
+            </a:solidFill>
+          </a:ln>
+        </p:spPr>
+        <p:style>
+          <a:lnRef idx="2">
+            <a:schemeClr val="accent1">
+              <a:shade val="50000"/>
+            </a:schemeClr>
+          </a:lnRef>
+          <a:fillRef idx="1">
+            <a:schemeClr val="accent1"/>
+          </a:fillRef>
+          <a:effectRef idx="0">
+            <a:schemeClr val="accent1"/>
+          </a:effectRef>
+          <a:fontRef idx="minor">
+            <a:schemeClr val="lt1"/>
+          </a:fontRef>
+        </p:style>
+        <p:txBody>
+          <a:bodyPr rtlCol="0" anchor="ctr"/>
+          <a:lstStyle/>
+          <a:p>
+            <a:pPr algn="ctr"/>
+            <a:endParaRPr lang="de-DE"/>
+          </a:p>
+        </p:txBody>
+      </p:sp>
+      <p:sp>
+        <p:nvSpPr>
+          <p:cNvPr id="33" name="Rechteck 32">
+            <a:extLst>
+              <a:ext uri="{FF2B5EF4-FFF2-40B4-BE49-F238E27FC236}">
+                <a16:creationId xmlns:a16="http://schemas.microsoft.com/office/drawing/2014/main" id="{4D81BE01-391E-4A20-9B4C-59945155E969}"/>
+              </a:ext>
+            </a:extLst>
+          </p:cNvPr>
+          <p:cNvSpPr/>
+          <p:nvPr/>
+        </p:nvSpPr>
+        <p:spPr>
+          <a:xfrm>
+            <a:off x="15000975" y="9372600"/>
+            <a:ext cx="1800000" cy="1800000"/>
+          </a:xfrm>
+          <a:prstGeom prst="rect">
+            <a:avLst/>
+          </a:prstGeom>
+          <a:noFill/>
+          <a:ln w="57150">
+            <a:solidFill>
+              <a:schemeClr val="tx1"/>
+            </a:solidFill>
+          </a:ln>
+        </p:spPr>
+        <p:style>
+          <a:lnRef idx="2">
+            <a:schemeClr val="accent1">
+              <a:shade val="50000"/>
+            </a:schemeClr>
+          </a:lnRef>
+          <a:fillRef idx="1">
+            <a:schemeClr val="accent1"/>
+          </a:fillRef>
+          <a:effectRef idx="0">
+            <a:schemeClr val="accent1"/>
+          </a:effectRef>
+          <a:fontRef idx="minor">
+            <a:schemeClr val="lt1"/>
+          </a:fontRef>
+        </p:style>
+        <p:txBody>
+          <a:bodyPr rtlCol="0" anchor="ctr"/>
+          <a:lstStyle/>
+          <a:p>
+            <a:pPr algn="ctr"/>
+            <a:endParaRPr lang="de-DE"/>
+          </a:p>
+        </p:txBody>
+      </p:sp>
+      <p:sp>
+        <p:nvSpPr>
+          <p:cNvPr id="34" name="Rechteck 33">
+            <a:extLst>
+              <a:ext uri="{FF2B5EF4-FFF2-40B4-BE49-F238E27FC236}">
+                <a16:creationId xmlns:a16="http://schemas.microsoft.com/office/drawing/2014/main" id="{FEAB5A89-94C7-4B22-9E45-9994D428A597}"/>
+              </a:ext>
+            </a:extLst>
+          </p:cNvPr>
+          <p:cNvSpPr/>
+          <p:nvPr/>
+        </p:nvSpPr>
+        <p:spPr>
+          <a:xfrm>
+            <a:off x="16800975" y="9372600"/>
+            <a:ext cx="1800000" cy="1800000"/>
+          </a:xfrm>
+          <a:prstGeom prst="rect">
+            <a:avLst/>
+          </a:prstGeom>
+          <a:noFill/>
+          <a:ln w="57150">
+            <a:solidFill>
+              <a:schemeClr val="tx1"/>
+            </a:solidFill>
+          </a:ln>
+        </p:spPr>
+        <p:style>
+          <a:lnRef idx="2">
+            <a:schemeClr val="accent1">
+              <a:shade val="50000"/>
+            </a:schemeClr>
+          </a:lnRef>
+          <a:fillRef idx="1">
+            <a:schemeClr val="accent1"/>
+          </a:fillRef>
+          <a:effectRef idx="0">
+            <a:schemeClr val="accent1"/>
+          </a:effectRef>
+          <a:fontRef idx="minor">
+            <a:schemeClr val="lt1"/>
+          </a:fontRef>
+        </p:style>
+        <p:txBody>
+          <a:bodyPr rtlCol="0" anchor="ctr"/>
+          <a:lstStyle/>
+          <a:p>
+            <a:pPr algn="ctr"/>
+            <a:endParaRPr lang="de-DE"/>
+          </a:p>
+        </p:txBody>
+      </p:sp>
+      <p:sp>
+        <p:nvSpPr>
+          <p:cNvPr id="35" name="Rechteck 34">
+            <a:extLst>
+              <a:ext uri="{FF2B5EF4-FFF2-40B4-BE49-F238E27FC236}">
+                <a16:creationId xmlns:a16="http://schemas.microsoft.com/office/drawing/2014/main" id="{73910DE9-0D73-4F28-B2AF-5C7B06F5802A}"/>
+              </a:ext>
+            </a:extLst>
+          </p:cNvPr>
+          <p:cNvSpPr/>
+          <p:nvPr/>
+        </p:nvSpPr>
+        <p:spPr>
+          <a:xfrm>
+            <a:off x="18600975" y="9372600"/>
+            <a:ext cx="1800000" cy="1800000"/>
+          </a:xfrm>
+          <a:prstGeom prst="rect">
+            <a:avLst/>
+          </a:prstGeom>
+          <a:noFill/>
+          <a:ln w="57150">
+            <a:solidFill>
+              <a:schemeClr val="tx1"/>
+            </a:solidFill>
+          </a:ln>
+        </p:spPr>
+        <p:style>
+          <a:lnRef idx="2">
+            <a:schemeClr val="accent1">
+              <a:shade val="50000"/>
+            </a:schemeClr>
+          </a:lnRef>
+          <a:fillRef idx="1">
+            <a:schemeClr val="accent1"/>
+          </a:fillRef>
+          <a:effectRef idx="0">
+            <a:schemeClr val="accent1"/>
+          </a:effectRef>
+          <a:fontRef idx="minor">
+            <a:schemeClr val="lt1"/>
+          </a:fontRef>
+        </p:style>
+        <p:txBody>
+          <a:bodyPr rtlCol="0" anchor="ctr"/>
+          <a:lstStyle/>
+          <a:p>
+            <a:pPr algn="ctr"/>
+            <a:endParaRPr lang="de-DE"/>
+          </a:p>
+        </p:txBody>
+      </p:sp>
+      <p:sp>
+        <p:nvSpPr>
+          <p:cNvPr id="37" name="Rechteck 36">
+            <a:extLst>
+              <a:ext uri="{FF2B5EF4-FFF2-40B4-BE49-F238E27FC236}">
+                <a16:creationId xmlns:a16="http://schemas.microsoft.com/office/drawing/2014/main" id="{C2D9045B-BC22-45D5-8DBE-5AC8B4C4AEAE}"/>
+              </a:ext>
+            </a:extLst>
+          </p:cNvPr>
+          <p:cNvSpPr/>
+          <p:nvPr/>
+        </p:nvSpPr>
+        <p:spPr>
+          <a:xfrm>
+            <a:off x="7800975" y="11696700"/>
+            <a:ext cx="1800000" cy="1800000"/>
+          </a:xfrm>
+          <a:prstGeom prst="rect">
+            <a:avLst/>
+          </a:prstGeom>
+          <a:noFill/>
+          <a:ln w="57150">
+            <a:solidFill>
+              <a:schemeClr val="tx1"/>
+            </a:solidFill>
+          </a:ln>
+        </p:spPr>
+        <p:style>
+          <a:lnRef idx="2">
+            <a:schemeClr val="accent1">
+              <a:shade val="50000"/>
+            </a:schemeClr>
+          </a:lnRef>
+          <a:fillRef idx="1">
+            <a:schemeClr val="accent1"/>
+          </a:fillRef>
+          <a:effectRef idx="0">
+            <a:schemeClr val="accent1"/>
+          </a:effectRef>
+          <a:fontRef idx="minor">
+            <a:schemeClr val="lt1"/>
+          </a:fontRef>
+        </p:style>
+        <p:txBody>
+          <a:bodyPr rtlCol="0" anchor="ctr"/>
+          <a:lstStyle/>
+          <a:p>
+            <a:pPr algn="ctr"/>
+            <a:endParaRPr lang="de-DE"/>
+          </a:p>
+        </p:txBody>
+      </p:sp>
+      <p:sp>
+        <p:nvSpPr>
+          <p:cNvPr id="38" name="Rechteck 37">
+            <a:extLst>
+              <a:ext uri="{FF2B5EF4-FFF2-40B4-BE49-F238E27FC236}">
+                <a16:creationId xmlns:a16="http://schemas.microsoft.com/office/drawing/2014/main" id="{3DDA0CC1-87ED-4DFE-9997-F358061D193B}"/>
+              </a:ext>
+            </a:extLst>
+          </p:cNvPr>
+          <p:cNvSpPr/>
+          <p:nvPr/>
+        </p:nvSpPr>
+        <p:spPr>
+          <a:xfrm>
+            <a:off x="9600975" y="11696700"/>
+            <a:ext cx="1800000" cy="1800000"/>
+          </a:xfrm>
+          <a:prstGeom prst="rect">
+            <a:avLst/>
+          </a:prstGeom>
+          <a:noFill/>
+          <a:ln w="57150">
+            <a:solidFill>
+              <a:schemeClr val="tx1"/>
+            </a:solidFill>
+          </a:ln>
+        </p:spPr>
+        <p:style>
+          <a:lnRef idx="2">
+            <a:schemeClr val="accent1">
+              <a:shade val="50000"/>
+            </a:schemeClr>
+          </a:lnRef>
+          <a:fillRef idx="1">
+            <a:schemeClr val="accent1"/>
+          </a:fillRef>
+          <a:effectRef idx="0">
+            <a:schemeClr val="accent1"/>
+          </a:effectRef>
+          <a:fontRef idx="minor">
+            <a:schemeClr val="lt1"/>
+          </a:fontRef>
+        </p:style>
+        <p:txBody>
+          <a:bodyPr rtlCol="0" anchor="ctr"/>
+          <a:lstStyle/>
+          <a:p>
+            <a:pPr algn="ctr"/>
+            <a:endParaRPr lang="de-DE"/>
+          </a:p>
+        </p:txBody>
+      </p:sp>
+      <p:sp>
+        <p:nvSpPr>
+          <p:cNvPr id="39" name="Rechteck 38">
+            <a:extLst>
+              <a:ext uri="{FF2B5EF4-FFF2-40B4-BE49-F238E27FC236}">
+                <a16:creationId xmlns:a16="http://schemas.microsoft.com/office/drawing/2014/main" id="{2476526A-6E0A-47B6-8BC7-4F21EF519D85}"/>
+              </a:ext>
+            </a:extLst>
+          </p:cNvPr>
+          <p:cNvSpPr/>
+          <p:nvPr/>
+        </p:nvSpPr>
+        <p:spPr>
+          <a:xfrm>
+            <a:off x="11400975" y="11696700"/>
+            <a:ext cx="1800000" cy="1800000"/>
+          </a:xfrm>
+          <a:prstGeom prst="rect">
+            <a:avLst/>
+          </a:prstGeom>
+          <a:noFill/>
+          <a:ln w="57150">
+            <a:solidFill>
+              <a:schemeClr val="tx1"/>
+            </a:solidFill>
+          </a:ln>
+        </p:spPr>
+        <p:style>
+          <a:lnRef idx="2">
+            <a:schemeClr val="accent1">
+              <a:shade val="50000"/>
+            </a:schemeClr>
+          </a:lnRef>
+          <a:fillRef idx="1">
+            <a:schemeClr val="accent1"/>
+          </a:fillRef>
+          <a:effectRef idx="0">
+            <a:schemeClr val="accent1"/>
+          </a:effectRef>
+          <a:fontRef idx="minor">
+            <a:schemeClr val="lt1"/>
+          </a:fontRef>
+        </p:style>
+        <p:txBody>
+          <a:bodyPr rtlCol="0" anchor="ctr"/>
+          <a:lstStyle/>
+          <a:p>
+            <a:pPr algn="ctr"/>
+            <a:endParaRPr lang="de-DE"/>
+          </a:p>
+        </p:txBody>
+      </p:sp>
+      <p:sp>
+        <p:nvSpPr>
+          <p:cNvPr id="40" name="Rechteck 39">
+            <a:extLst>
+              <a:ext uri="{FF2B5EF4-FFF2-40B4-BE49-F238E27FC236}">
+                <a16:creationId xmlns:a16="http://schemas.microsoft.com/office/drawing/2014/main" id="{2436F4BA-2DB4-4138-9F0C-B0D51B77ECB8}"/>
+              </a:ext>
+            </a:extLst>
+          </p:cNvPr>
+          <p:cNvSpPr/>
+          <p:nvPr/>
+        </p:nvSpPr>
+        <p:spPr>
+          <a:xfrm>
+            <a:off x="13200975" y="11696700"/>
+            <a:ext cx="1800000" cy="1800000"/>
+          </a:xfrm>
+          <a:prstGeom prst="rect">
+            <a:avLst/>
+          </a:prstGeom>
+          <a:noFill/>
+          <a:ln w="57150">
+            <a:solidFill>
+              <a:schemeClr val="tx1"/>
+            </a:solidFill>
+          </a:ln>
+        </p:spPr>
+        <p:style>
+          <a:lnRef idx="2">
+            <a:schemeClr val="accent1">
+              <a:shade val="50000"/>
+            </a:schemeClr>
+          </a:lnRef>
+          <a:fillRef idx="1">
+            <a:schemeClr val="accent1"/>
+          </a:fillRef>
+          <a:effectRef idx="0">
+            <a:schemeClr val="accent1"/>
+          </a:effectRef>
+          <a:fontRef idx="minor">
+            <a:schemeClr val="lt1"/>
+          </a:fontRef>
+        </p:style>
+        <p:txBody>
+          <a:bodyPr rtlCol="0" anchor="ctr"/>
+          <a:lstStyle/>
+          <a:p>
+            <a:pPr algn="ctr"/>
+            <a:endParaRPr lang="de-DE"/>
+          </a:p>
+        </p:txBody>
+      </p:sp>
+      <p:sp>
+        <p:nvSpPr>
+          <p:cNvPr id="41" name="Rechteck 40">
+            <a:extLst>
+              <a:ext uri="{FF2B5EF4-FFF2-40B4-BE49-F238E27FC236}">
+                <a16:creationId xmlns:a16="http://schemas.microsoft.com/office/drawing/2014/main" id="{73BD866A-20CB-458A-B85E-5F00712989B0}"/>
+              </a:ext>
+            </a:extLst>
+          </p:cNvPr>
+          <p:cNvSpPr/>
+          <p:nvPr/>
+        </p:nvSpPr>
+        <p:spPr>
+          <a:xfrm>
+            <a:off x="15000975" y="11696700"/>
+            <a:ext cx="1800000" cy="1800000"/>
+          </a:xfrm>
+          <a:prstGeom prst="rect">
+            <a:avLst/>
+          </a:prstGeom>
+          <a:noFill/>
+          <a:ln w="57150">
+            <a:solidFill>
+              <a:schemeClr val="tx1"/>
+            </a:solidFill>
+          </a:ln>
+        </p:spPr>
+        <p:style>
+          <a:lnRef idx="2">
+            <a:schemeClr val="accent1">
+              <a:shade val="50000"/>
+            </a:schemeClr>
+          </a:lnRef>
+          <a:fillRef idx="1">
+            <a:schemeClr val="accent1"/>
+          </a:fillRef>
+          <a:effectRef idx="0">
+            <a:schemeClr val="accent1"/>
+          </a:effectRef>
+          <a:fontRef idx="minor">
+            <a:schemeClr val="lt1"/>
+          </a:fontRef>
+        </p:style>
+        <p:txBody>
+          <a:bodyPr rtlCol="0" anchor="ctr"/>
+          <a:lstStyle/>
+          <a:p>
+            <a:pPr algn="ctr"/>
+            <a:endParaRPr lang="de-DE"/>
+          </a:p>
+        </p:txBody>
+      </p:sp>
+      <p:sp>
+        <p:nvSpPr>
+          <p:cNvPr id="42" name="Rechteck 41">
+            <a:extLst>
+              <a:ext uri="{FF2B5EF4-FFF2-40B4-BE49-F238E27FC236}">
+                <a16:creationId xmlns:a16="http://schemas.microsoft.com/office/drawing/2014/main" id="{A44773F6-EB30-426C-8DDB-904E000864B9}"/>
+              </a:ext>
+            </a:extLst>
+          </p:cNvPr>
+          <p:cNvSpPr/>
+          <p:nvPr/>
+        </p:nvSpPr>
+        <p:spPr>
+          <a:xfrm>
+            <a:off x="16800975" y="11696700"/>
+            <a:ext cx="1800000" cy="1800000"/>
+          </a:xfrm>
+          <a:prstGeom prst="rect">
+            <a:avLst/>
+          </a:prstGeom>
+          <a:noFill/>
+          <a:ln w="57150">
+            <a:solidFill>
+              <a:schemeClr val="tx1"/>
+            </a:solidFill>
+          </a:ln>
+        </p:spPr>
+        <p:style>
+          <a:lnRef idx="2">
+            <a:schemeClr val="accent1">
+              <a:shade val="50000"/>
+            </a:schemeClr>
+          </a:lnRef>
+          <a:fillRef idx="1">
+            <a:schemeClr val="accent1"/>
+          </a:fillRef>
+          <a:effectRef idx="0">
+            <a:schemeClr val="accent1"/>
+          </a:effectRef>
+          <a:fontRef idx="minor">
+            <a:schemeClr val="lt1"/>
+          </a:fontRef>
+        </p:style>
+        <p:txBody>
+          <a:bodyPr rtlCol="0" anchor="ctr"/>
+          <a:lstStyle/>
+          <a:p>
+            <a:pPr algn="ctr"/>
+            <a:endParaRPr lang="de-DE"/>
+          </a:p>
+        </p:txBody>
+      </p:sp>
+      <p:sp>
+        <p:nvSpPr>
+          <p:cNvPr id="43" name="Rechteck 42">
+            <a:extLst>
+              <a:ext uri="{FF2B5EF4-FFF2-40B4-BE49-F238E27FC236}">
+                <a16:creationId xmlns:a16="http://schemas.microsoft.com/office/drawing/2014/main" id="{8A03706F-D02B-4D16-AB37-C8DEF34B513D}"/>
+              </a:ext>
+            </a:extLst>
+          </p:cNvPr>
+          <p:cNvSpPr/>
+          <p:nvPr/>
+        </p:nvSpPr>
+        <p:spPr>
+          <a:xfrm>
+            <a:off x="18600975" y="11696700"/>
+            <a:ext cx="1800000" cy="1800000"/>
+          </a:xfrm>
+          <a:prstGeom prst="rect">
+            <a:avLst/>
+          </a:prstGeom>
+          <a:noFill/>
+          <a:ln w="57150">
+            <a:solidFill>
+              <a:schemeClr val="tx1"/>
+            </a:solidFill>
+          </a:ln>
+        </p:spPr>
+        <p:style>
+          <a:lnRef idx="2">
+            <a:schemeClr val="accent1">
+              <a:shade val="50000"/>
+            </a:schemeClr>
+          </a:lnRef>
+          <a:fillRef idx="1">
+            <a:schemeClr val="accent1"/>
+          </a:fillRef>
+          <a:effectRef idx="0">
+            <a:schemeClr val="accent1"/>
+          </a:effectRef>
+          <a:fontRef idx="minor">
+            <a:schemeClr val="lt1"/>
+          </a:fontRef>
+        </p:style>
+        <p:txBody>
+          <a:bodyPr rtlCol="0" anchor="ctr"/>
+          <a:lstStyle/>
+          <a:p>
+            <a:pPr algn="ctr"/>
+            <a:endParaRPr lang="de-DE"/>
+          </a:p>
+        </p:txBody>
+      </p:sp>
+      <p:sp>
+        <p:nvSpPr>
+          <p:cNvPr id="44" name="Rechteck 43">
+            <a:extLst>
+              <a:ext uri="{FF2B5EF4-FFF2-40B4-BE49-F238E27FC236}">
+                <a16:creationId xmlns:a16="http://schemas.microsoft.com/office/drawing/2014/main" id="{E806AA4E-181F-467B-8CBA-A7ACC5BEFAA0}"/>
+              </a:ext>
+            </a:extLst>
+          </p:cNvPr>
+          <p:cNvSpPr/>
+          <p:nvPr/>
+        </p:nvSpPr>
+        <p:spPr>
+          <a:xfrm>
+            <a:off x="20400975" y="11696700"/>
+            <a:ext cx="1800000" cy="1800000"/>
+          </a:xfrm>
+          <a:prstGeom prst="rect">
+            <a:avLst/>
+          </a:prstGeom>
+          <a:noFill/>
+          <a:ln w="57150">
+            <a:solidFill>
+              <a:schemeClr val="tx1"/>
+            </a:solidFill>
+          </a:ln>
+        </p:spPr>
+        <p:style>
+          <a:lnRef idx="2">
+            <a:schemeClr val="accent1">
+              <a:shade val="50000"/>
+            </a:schemeClr>
+          </a:lnRef>
+          <a:fillRef idx="1">
+            <a:schemeClr val="accent1"/>
+          </a:fillRef>
+          <a:effectRef idx="0">
+            <a:schemeClr val="accent1"/>
+          </a:effectRef>
+          <a:fontRef idx="minor">
+            <a:schemeClr val="lt1"/>
+          </a:fontRef>
+        </p:style>
+        <p:txBody>
+          <a:bodyPr rtlCol="0" anchor="ctr"/>
+          <a:lstStyle/>
+          <a:p>
+            <a:pPr algn="ctr"/>
+            <a:endParaRPr lang="de-DE"/>
+          </a:p>
+        </p:txBody>
+      </p:sp>
+      <p:sp>
+        <p:nvSpPr>
+          <p:cNvPr id="45" name="Textfeld 44">
+            <a:extLst>
+              <a:ext uri="{FF2B5EF4-FFF2-40B4-BE49-F238E27FC236}">
+                <a16:creationId xmlns:a16="http://schemas.microsoft.com/office/drawing/2014/main" id="{B679EB13-00A1-45AA-B99C-5D6465F18422}"/>
+              </a:ext>
+            </a:extLst>
+          </p:cNvPr>
+          <p:cNvSpPr txBox="1"/>
+          <p:nvPr/>
+        </p:nvSpPr>
+        <p:spPr>
+          <a:xfrm>
+            <a:off x="23373125" y="2400300"/>
+            <a:ext cx="2626040" cy="1446550"/>
+          </a:xfrm>
+          <a:prstGeom prst="rect">
+            <a:avLst/>
+          </a:prstGeom>
+          <a:noFill/>
+        </p:spPr>
+        <p:txBody>
+          <a:bodyPr wrap="none" rtlCol="0">
+            <a:spAutoFit/>
+          </a:bodyPr>
+          <a:lstStyle/>
+          <a:p>
+            <a:r>
+              <a:rPr lang="de-DE" sz="8800" dirty="0"/>
+              <a:t>Input</a:t>
+            </a:r>
+          </a:p>
+        </p:txBody>
+      </p:sp>
+      <p:sp>
+        <p:nvSpPr>
+          <p:cNvPr id="46" name="Textfeld 45">
+            <a:extLst>
+              <a:ext uri="{FF2B5EF4-FFF2-40B4-BE49-F238E27FC236}">
+                <a16:creationId xmlns:a16="http://schemas.microsoft.com/office/drawing/2014/main" id="{1D9A93A4-8490-4D45-94D9-EA1CCE43BFFC}"/>
+              </a:ext>
+            </a:extLst>
+          </p:cNvPr>
+          <p:cNvSpPr txBox="1"/>
+          <p:nvPr/>
+        </p:nvSpPr>
+        <p:spPr>
+          <a:xfrm>
+            <a:off x="23373125" y="12050150"/>
+            <a:ext cx="3467616" cy="1446550"/>
+          </a:xfrm>
+          <a:prstGeom prst="rect">
+            <a:avLst/>
+          </a:prstGeom>
+          <a:noFill/>
+        </p:spPr>
+        <p:txBody>
+          <a:bodyPr wrap="none" rtlCol="0">
+            <a:spAutoFit/>
+          </a:bodyPr>
+          <a:lstStyle/>
+          <a:p>
+            <a:r>
+              <a:rPr lang="de-DE" sz="8800" dirty="0"/>
+              <a:t>Output</a:t>
+            </a:r>
+          </a:p>
+        </p:txBody>
+      </p:sp>
+      <p:sp>
+        <p:nvSpPr>
+          <p:cNvPr id="47" name="Textfeld 46">
+            <a:extLst>
+              <a:ext uri="{FF2B5EF4-FFF2-40B4-BE49-F238E27FC236}">
+                <a16:creationId xmlns:a16="http://schemas.microsoft.com/office/drawing/2014/main" id="{0A975289-B895-45D9-8367-2A31D0C0647D}"/>
+              </a:ext>
+            </a:extLst>
+          </p:cNvPr>
+          <p:cNvSpPr txBox="1"/>
+          <p:nvPr/>
+        </p:nvSpPr>
+        <p:spPr>
+          <a:xfrm>
+            <a:off x="23373125" y="7048500"/>
+            <a:ext cx="6021841" cy="1446550"/>
+          </a:xfrm>
+          <a:prstGeom prst="rect">
+            <a:avLst/>
+          </a:prstGeom>
+          <a:noFill/>
+        </p:spPr>
+        <p:txBody>
+          <a:bodyPr wrap="none" rtlCol="0">
+            <a:spAutoFit/>
+          </a:bodyPr>
+          <a:lstStyle/>
+          <a:p>
+            <a:r>
+              <a:rPr lang="de-DE" sz="8800" dirty="0"/>
+              <a:t>Latent Space</a:t>
+            </a:r>
+          </a:p>
+        </p:txBody>
+      </p:sp>
+      <p:sp>
+        <p:nvSpPr>
+          <p:cNvPr id="48" name="Geschweifte Klammer links 47">
+            <a:extLst>
+              <a:ext uri="{FF2B5EF4-FFF2-40B4-BE49-F238E27FC236}">
+                <a16:creationId xmlns:a16="http://schemas.microsoft.com/office/drawing/2014/main" id="{7A89372A-D042-4865-8EEE-B7BF1F23C250}"/>
+              </a:ext>
+            </a:extLst>
+          </p:cNvPr>
+          <p:cNvSpPr/>
+          <p:nvPr/>
+        </p:nvSpPr>
+        <p:spPr>
+          <a:xfrm>
+            <a:off x="4543425" y="2400300"/>
+            <a:ext cx="2486025" cy="6448200"/>
+          </a:xfrm>
+          <a:prstGeom prst="leftBrace">
+            <a:avLst/>
+          </a:prstGeom>
+          <a:ln w="57150">
+            <a:solidFill>
+              <a:schemeClr val="tx1"/>
+            </a:solidFill>
+          </a:ln>
+        </p:spPr>
+        <p:style>
+          <a:lnRef idx="1">
+            <a:schemeClr val="accent1"/>
+          </a:lnRef>
+          <a:fillRef idx="0">
+            <a:schemeClr val="accent1"/>
+          </a:fillRef>
+          <a:effectRef idx="0">
+            <a:schemeClr val="accent1"/>
+          </a:effectRef>
+          <a:fontRef idx="minor">
+            <a:schemeClr val="tx1"/>
+          </a:fontRef>
+        </p:style>
+        <p:txBody>
+          <a:bodyPr rtlCol="0" anchor="ctr"/>
+          <a:lstStyle/>
+          <a:p>
+            <a:pPr algn="ctr"/>
+            <a:endParaRPr lang="de-DE"/>
+          </a:p>
+        </p:txBody>
+      </p:sp>
+      <p:sp>
+        <p:nvSpPr>
+          <p:cNvPr id="50" name="Geschweifte Klammer links 49">
+            <a:extLst>
+              <a:ext uri="{FF2B5EF4-FFF2-40B4-BE49-F238E27FC236}">
+                <a16:creationId xmlns:a16="http://schemas.microsoft.com/office/drawing/2014/main" id="{56DF8BE3-39A1-496E-961B-F23783FF07B8}"/>
+              </a:ext>
+            </a:extLst>
+          </p:cNvPr>
+          <p:cNvSpPr/>
+          <p:nvPr/>
+        </p:nvSpPr>
+        <p:spPr>
+          <a:xfrm>
+            <a:off x="3924300" y="7048500"/>
+            <a:ext cx="2486025" cy="6448200"/>
+          </a:xfrm>
+          <a:prstGeom prst="leftBrace">
+            <a:avLst/>
+          </a:prstGeom>
+          <a:ln w="57150">
+            <a:solidFill>
+              <a:schemeClr val="tx1"/>
+            </a:solidFill>
+          </a:ln>
+        </p:spPr>
+        <p:style>
+          <a:lnRef idx="1">
+            <a:schemeClr val="accent1"/>
+          </a:lnRef>
+          <a:fillRef idx="0">
+            <a:schemeClr val="accent1"/>
+          </a:fillRef>
+          <a:effectRef idx="0">
+            <a:schemeClr val="accent1"/>
+          </a:effectRef>
+          <a:fontRef idx="minor">
+            <a:schemeClr val="tx1"/>
+          </a:fontRef>
+        </p:style>
+        <p:txBody>
+          <a:bodyPr rtlCol="0" anchor="ctr"/>
+          <a:lstStyle/>
+          <a:p>
+            <a:pPr algn="ctr"/>
+            <a:endParaRPr lang="de-DE"/>
+          </a:p>
+        </p:txBody>
+      </p:sp>
+      <p:sp>
+        <p:nvSpPr>
+          <p:cNvPr id="51" name="Textfeld 50">
+            <a:extLst>
+              <a:ext uri="{FF2B5EF4-FFF2-40B4-BE49-F238E27FC236}">
+                <a16:creationId xmlns:a16="http://schemas.microsoft.com/office/drawing/2014/main" id="{DB2C7F8A-43A6-40B6-AFB5-0B0FF242F226}"/>
+              </a:ext>
+            </a:extLst>
+          </p:cNvPr>
+          <p:cNvSpPr txBox="1"/>
+          <p:nvPr/>
+        </p:nvSpPr>
+        <p:spPr>
+          <a:xfrm>
+            <a:off x="518770" y="4724400"/>
+            <a:ext cx="3939155" cy="1446550"/>
+          </a:xfrm>
+          <a:prstGeom prst="rect">
+            <a:avLst/>
+          </a:prstGeom>
+          <a:noFill/>
+        </p:spPr>
+        <p:txBody>
+          <a:bodyPr wrap="none" rtlCol="0">
+            <a:spAutoFit/>
+          </a:bodyPr>
+          <a:lstStyle/>
+          <a:p>
+            <a:r>
+              <a:rPr lang="de-DE" sz="8800" dirty="0"/>
+              <a:t>Encoder</a:t>
+            </a:r>
+          </a:p>
+        </p:txBody>
+      </p:sp>
+      <p:sp>
+        <p:nvSpPr>
+          <p:cNvPr id="52" name="Textfeld 51">
+            <a:extLst>
+              <a:ext uri="{FF2B5EF4-FFF2-40B4-BE49-F238E27FC236}">
+                <a16:creationId xmlns:a16="http://schemas.microsoft.com/office/drawing/2014/main" id="{B2186339-1107-47E3-8F54-36D04A055657}"/>
+              </a:ext>
+            </a:extLst>
+          </p:cNvPr>
+          <p:cNvSpPr txBox="1"/>
+          <p:nvPr/>
+        </p:nvSpPr>
+        <p:spPr>
+          <a:xfrm>
+            <a:off x="508768" y="9838762"/>
+            <a:ext cx="4049763" cy="1446550"/>
+          </a:xfrm>
+          <a:prstGeom prst="rect">
+            <a:avLst/>
+          </a:prstGeom>
+          <a:noFill/>
+        </p:spPr>
+        <p:txBody>
+          <a:bodyPr wrap="none" rtlCol="0">
+            <a:spAutoFit/>
+          </a:bodyPr>
+          <a:lstStyle/>
+          <a:p>
+            <a:r>
+              <a:rPr lang="de-DE" sz="8800" dirty="0"/>
+              <a:t>Decoder</a:t>
+            </a:r>
+          </a:p>
+        </p:txBody>
+      </p:sp>
+    </p:spTree>
+    <p:extLst>
+      <p:ext uri="{BB962C8B-B14F-4D97-AF65-F5344CB8AC3E}">
+        <p14:creationId xmlns:p14="http://schemas.microsoft.com/office/powerpoint/2010/main" val="3643668870"/>
+      </p:ext>
+    </p:extLst>
+  </p:cSld>
+  <p:clrMapOvr>
+    <a:masterClrMapping/>
+  </p:clrMapOvr>
+</p:sld>
+</file>
+
 <file path=ppt/theme/theme1.xml><?xml version="1.0" encoding="utf-8"?>
 <a:theme xmlns:a="http://schemas.openxmlformats.org/drawingml/2006/main" name="Office">
   <a:themeElements>

</xml_diff>